<commit_message>
add pptx a little
</commit_message>
<xml_diff>
--- a/vmtkSetup/setup.pptx
+++ b/vmtkSetup/setup.pptx
@@ -4055,7 +4055,12 @@
             <p:ph idx="1"/>
           </p:nvPr>
         </p:nvSpPr>
-        <p:spPr/>
+        <p:spPr>
+          <a:xfrm>
+            <a:off x="-1" y="1089891"/>
+            <a:ext cx="12575459" cy="5169477"/>
+          </a:xfrm>
+        </p:spPr>
         <p:txBody>
           <a:bodyPr/>
           <a:lstStyle/>
@@ -4088,21 +4093,15 @@
             </a:r>
             <a:r>
               <a:rPr kumimoji="1" lang="ja-JP" altLang="en-US" dirty="0"/>
-              <a:t>に従って環境構築すればいいのだが、</a:t>
+              <a:t>に従って環境構築できればいいのだが、少し苦労した</a:t>
             </a:r>
             <a:r>
               <a:rPr lang="ja-JP" altLang="en-US" dirty="0"/>
-              <a:t>意外と分かりにくかったので</a:t>
-            </a:r>
-            <a:endParaRPr lang="en-US" altLang="ja-JP" dirty="0"/>
-          </a:p>
-          <a:p>
-            <a:pPr marL="0" indent="0">
-              <a:buNone/>
-            </a:pPr>
+              <a:t>ので</a:t>
+            </a:r>
             <a:r>
               <a:rPr kumimoji="1" lang="ja-JP" altLang="en-US" dirty="0"/>
-              <a:t>　覚書として残しておく</a:t>
+              <a:t>覚書として残しておく</a:t>
             </a:r>
             <a:endParaRPr kumimoji="1" lang="en-US" altLang="ja-JP" dirty="0"/>
           </a:p>
@@ -5044,7 +5043,7 @@
               <a:rPr lang="en-US" altLang="ja-JP" dirty="0">
                 <a:hlinkClick r:id="rId2"/>
               </a:rPr>
-              <a:t>http://www.vmtk.org/tutorials/</a:t>
+              <a:t>http://www.vmtk.org/documentation/vmtkscripts.html</a:t>
             </a:r>
             <a:endParaRPr lang="en-US" altLang="ja-JP" dirty="0"/>
           </a:p>
@@ -5121,14 +5120,96 @@
         </p:blipFill>
         <p:spPr>
           <a:xfrm>
-            <a:off x="6529658" y="2744919"/>
-            <a:ext cx="5106670" cy="4006501"/>
+            <a:off x="6917882" y="3110459"/>
+            <a:ext cx="4590626" cy="3601632"/>
           </a:xfrm>
           <a:prstGeom prst="rect">
             <a:avLst/>
           </a:prstGeom>
         </p:spPr>
       </p:pic>
+      <p:pic>
+        <p:nvPicPr>
+          <p:cNvPr id="7" name="図 6" descr="ロゴ&#10;&#10;中程度の精度で自動的に生成された説明">
+            <a:extLst>
+              <a:ext uri="{FF2B5EF4-FFF2-40B4-BE49-F238E27FC236}">
+                <a16:creationId xmlns:a16="http://schemas.microsoft.com/office/drawing/2014/main" id="{F1E29FA7-1C92-63CA-E38E-CCE628B2D98C}"/>
+              </a:ext>
+            </a:extLst>
+          </p:cNvPr>
+          <p:cNvPicPr>
+            <a:picLocks noChangeAspect="1"/>
+          </p:cNvPicPr>
+          <p:nvPr/>
+        </p:nvPicPr>
+        <p:blipFill>
+          <a:blip r:embed="rId4">
+            <a:extLst>
+              <a:ext uri="{28A0092B-C50C-407E-A947-70E740481C1C}">
+                <a14:useLocalDpi xmlns:a14="http://schemas.microsoft.com/office/drawing/2010/main" val="0"/>
+              </a:ext>
+            </a:extLst>
+          </a:blip>
+          <a:stretch>
+            <a:fillRect/>
+          </a:stretch>
+        </p:blipFill>
+        <p:spPr>
+          <a:xfrm>
+            <a:off x="4994659" y="4875494"/>
+            <a:ext cx="685859" cy="815411"/>
+          </a:xfrm>
+          <a:prstGeom prst="rect">
+            <a:avLst/>
+          </a:prstGeom>
+        </p:spPr>
+      </p:pic>
+      <p:sp>
+        <p:nvSpPr>
+          <p:cNvPr id="8" name="矢印: 右 7">
+            <a:extLst>
+              <a:ext uri="{FF2B5EF4-FFF2-40B4-BE49-F238E27FC236}">
+                <a16:creationId xmlns:a16="http://schemas.microsoft.com/office/drawing/2014/main" id="{46FB1C47-184E-AF9A-ABF9-515F3761B916}"/>
+              </a:ext>
+            </a:extLst>
+          </p:cNvPr>
+          <p:cNvSpPr/>
+          <p:nvPr/>
+        </p:nvSpPr>
+        <p:spPr>
+          <a:xfrm>
+            <a:off x="6096000" y="5008880"/>
+            <a:ext cx="406400" cy="274320"/>
+          </a:xfrm>
+          <a:prstGeom prst="rightArrow">
+            <a:avLst/>
+          </a:prstGeom>
+        </p:spPr>
+        <p:style>
+          <a:lnRef idx="2">
+            <a:schemeClr val="accent1">
+              <a:shade val="15000"/>
+            </a:schemeClr>
+          </a:lnRef>
+          <a:fillRef idx="1">
+            <a:schemeClr val="accent1"/>
+          </a:fillRef>
+          <a:effectRef idx="0">
+            <a:schemeClr val="accent1"/>
+          </a:effectRef>
+          <a:fontRef idx="minor">
+            <a:schemeClr val="lt1"/>
+          </a:fontRef>
+        </p:style>
+        <p:txBody>
+          <a:bodyPr rtlCol="0" anchor="ctr"/>
+          <a:lstStyle/>
+          <a:p>
+            <a:pPr algn="ctr"/>
+            <a:endParaRPr kumimoji="1" lang="ja-JP" altLang="en-US"/>
+          </a:p>
+        </p:txBody>
+      </p:sp>
     </p:spTree>
     <p:extLst>
       <p:ext uri="{BB962C8B-B14F-4D97-AF65-F5344CB8AC3E}">
@@ -5219,9 +5300,16 @@
             <p:ph idx="1"/>
           </p:nvPr>
         </p:nvSpPr>
-        <p:spPr/>
-        <p:txBody>
-          <a:bodyPr/>
+        <p:spPr>
+          <a:xfrm>
+            <a:off x="-1" y="765427"/>
+            <a:ext cx="11508509" cy="5169477"/>
+          </a:xfrm>
+        </p:spPr>
+        <p:txBody>
+          <a:bodyPr>
+            <a:normAutofit fontScale="92500" lnSpcReduction="10000"/>
+          </a:bodyPr>
           <a:lstStyle/>
           <a:p>
             <a:pPr marL="0" indent="0">
@@ -5355,7 +5443,63 @@
               <a:rPr lang="ja-JP" altLang="en-US" dirty="0"/>
               <a:t>」で実行</a:t>
             </a:r>
+            <a:endParaRPr lang="en-US" altLang="ja-JP" dirty="0"/>
+          </a:p>
+          <a:p>
+            <a:pPr marL="0" indent="0">
+              <a:buNone/>
+            </a:pPr>
             <a:endParaRPr kumimoji="1" lang="en-US" altLang="ja-JP" dirty="0"/>
+          </a:p>
+          <a:p>
+            <a:pPr marL="0" indent="0">
+              <a:buNone/>
+            </a:pPr>
+            <a:r>
+              <a:rPr kumimoji="1" lang="ja-JP" altLang="en-US" dirty="0">
+                <a:solidFill>
+                  <a:srgbClr val="FF0000"/>
+                </a:solidFill>
+              </a:rPr>
+              <a:t>基本的に</a:t>
+            </a:r>
+            <a:r>
+              <a:rPr lang="en-US" altLang="ja-JP" dirty="0" err="1">
+                <a:solidFill>
+                  <a:srgbClr val="FF0000"/>
+                </a:solidFill>
+              </a:rPr>
+              <a:t>vmtk</a:t>
+            </a:r>
+            <a:r>
+              <a:rPr lang="ja-JP" altLang="en-US" dirty="0">
+                <a:solidFill>
+                  <a:srgbClr val="FF0000"/>
+                </a:solidFill>
+              </a:rPr>
+              <a:t>側で予想されてない入力があると、すぐに動かなくなるし、一度処理を終えた後も動かなくなるので、困ったら</a:t>
+            </a:r>
+            <a:r>
+              <a:rPr lang="en-US" altLang="ja-JP" dirty="0" err="1">
+                <a:solidFill>
+                  <a:srgbClr val="FF0000"/>
+                </a:solidFill>
+              </a:rPr>
+              <a:t>vmtk</a:t>
+            </a:r>
+            <a:r>
+              <a:rPr lang="ja-JP" altLang="en-US" dirty="0">
+                <a:solidFill>
+                  <a:srgbClr val="FF0000"/>
+                </a:solidFill>
+              </a:rPr>
+              <a:t>を再起動する</a:t>
+            </a:r>
+            <a:endParaRPr kumimoji="1" lang="en-US" altLang="ja-JP" dirty="0">
+              <a:solidFill>
+                <a:srgbClr val="FF0000"/>
+              </a:solidFill>
+            </a:endParaRPr>
           </a:p>
         </p:txBody>
       </p:sp>

</xml_diff>